<commit_message>
Presentation update: Hudson => Jenkins
</commit_message>
<xml_diff>
--- a/maven-plugins.pptx
+++ b/maven-plugins.pptx
@@ -334,7 +334,7 @@
               <a:pPr>
                 <a:defRPr/>
               </a:pPr>
-              <a:t>2011-03-04</a:t>
+              <a:t>2011-03-06</a:t>
             </a:fld>
             <a:endParaRPr lang="fr-CA"/>
           </a:p>
@@ -432,6 +432,11 @@
         </p:txBody>
       </p:sp>
     </p:spTree>
+    <p:extLst>
+      <p:ext uri="{BB962C8B-B14F-4D97-AF65-F5344CB8AC3E}">
+        <p14:creationId xmlns:p14="http://schemas.microsoft.com/office/powerpoint/2010/main" val="794235697"/>
+      </p:ext>
+    </p:extLst>
   </p:cSld>
   <p:clrMap bg1="lt1" tx1="dk1" bg2="lt2" tx2="dk2" accent1="accent1" accent2="accent2" accent3="accent3" accent4="accent4" accent5="accent5" accent6="accent6" hlink="hlink" folHlink="folHlink"/>
 </p:handoutMaster>
@@ -628,7 +633,7 @@
               <a:pPr>
                 <a:defRPr/>
               </a:pPr>
-              <a:t>2011-03-04</a:t>
+              <a:t>2011-03-06</a:t>
             </a:fld>
             <a:endParaRPr lang="fr-CA"/>
           </a:p>
@@ -820,7 +825,7 @@
               <a:pPr>
                 <a:defRPr/>
               </a:pPr>
-              <a:t>2011-03-04</a:t>
+              <a:t>2011-03-06</a:t>
             </a:fld>
             <a:endParaRPr lang="fr-CA"/>
           </a:p>
@@ -1022,7 +1027,7 @@
               <a:pPr>
                 <a:defRPr/>
               </a:pPr>
-              <a:t>2011-03-04</a:t>
+              <a:t>2011-03-06</a:t>
             </a:fld>
             <a:endParaRPr lang="fr-CA"/>
           </a:p>
@@ -1214,7 +1219,7 @@
               <a:pPr>
                 <a:defRPr/>
               </a:pPr>
-              <a:t>2011-03-04</a:t>
+              <a:t>2011-03-06</a:t>
             </a:fld>
             <a:endParaRPr lang="fr-CA"/>
           </a:p>
@@ -1482,7 +1487,7 @@
               <a:pPr>
                 <a:defRPr/>
               </a:pPr>
-              <a:t>2011-03-04</a:t>
+              <a:t>2011-03-06</a:t>
             </a:fld>
             <a:endParaRPr lang="fr-CA"/>
           </a:p>
@@ -1792,7 +1797,7 @@
               <a:pPr>
                 <a:defRPr/>
               </a:pPr>
-              <a:t>2011-03-04</a:t>
+              <a:t>2011-03-06</a:t>
             </a:fld>
             <a:endParaRPr lang="fr-CA"/>
           </a:p>
@@ -2241,7 +2246,7 @@
               <a:pPr>
                 <a:defRPr/>
               </a:pPr>
-              <a:t>2011-03-04</a:t>
+              <a:t>2011-03-06</a:t>
             </a:fld>
             <a:endParaRPr lang="fr-CA"/>
           </a:p>
@@ -2381,7 +2386,7 @@
               <a:pPr>
                 <a:defRPr/>
               </a:pPr>
-              <a:t>2011-03-04</a:t>
+              <a:t>2011-03-06</a:t>
             </a:fld>
             <a:endParaRPr lang="fr-CA"/>
           </a:p>
@@ -2498,7 +2503,7 @@
               <a:pPr>
                 <a:defRPr/>
               </a:pPr>
-              <a:t>2011-03-04</a:t>
+              <a:t>2011-03-06</a:t>
             </a:fld>
             <a:endParaRPr lang="fr-CA"/>
           </a:p>
@@ -2797,7 +2802,7 @@
               <a:pPr>
                 <a:defRPr/>
               </a:pPr>
-              <a:t>2011-03-04</a:t>
+              <a:t>2011-03-06</a:t>
             </a:fld>
             <a:endParaRPr lang="fr-CA"/>
           </a:p>
@@ -3079,7 +3084,7 @@
               <a:pPr>
                 <a:defRPr/>
               </a:pPr>
-              <a:t>2011-03-04</a:t>
+              <a:t>2011-03-06</a:t>
             </a:fld>
             <a:endParaRPr lang="fr-CA"/>
           </a:p>
@@ -3343,7 +3348,7 @@
               <a:pPr>
                 <a:defRPr/>
               </a:pPr>
-              <a:t>2011-03-04</a:t>
+              <a:t>2011-03-06</a:t>
             </a:fld>
             <a:endParaRPr lang="fr-CA"/>
           </a:p>
@@ -8957,19 +8962,13 @@
               <a:rPr lang="en-US" b="1" dirty="0" err="1" smtClean="0">
                 <a:latin typeface="Candara" pitchFamily="34" charset="0"/>
               </a:rPr>
-              <a:t>hudson</a:t>
+              <a:t>jenkins</a:t>
             </a:r>
             <a:r>
               <a:rPr lang="en-US" b="1" dirty="0" smtClean="0">
                 <a:latin typeface="Candara" pitchFamily="34" charset="0"/>
               </a:rPr>
-              <a:t>-</a:t>
-            </a:r>
-            <a:r>
-              <a:rPr lang="en-US" b="1" dirty="0" err="1" smtClean="0">
-                <a:latin typeface="Candara" pitchFamily="34" charset="0"/>
-              </a:rPr>
-              <a:t>plugin</a:t>
+              <a:t>-plugin</a:t>
             </a:r>
             <a:endParaRPr lang="en-US" b="1" dirty="0" smtClean="0">
               <a:latin typeface="Candara" pitchFamily="34" charset="0"/>
@@ -8981,7 +8980,19 @@
               <a:rPr lang="en-US" dirty="0" smtClean="0">
                 <a:latin typeface="Candara" pitchFamily="34" charset="0"/>
               </a:rPr>
-              <a:t>Generates Hudson jobs</a:t>
+              <a:t>Generates </a:t>
+            </a:r>
+            <a:r>
+              <a:rPr lang="en-US" dirty="0" smtClean="0">
+                <a:latin typeface="Candara" pitchFamily="34" charset="0"/>
+              </a:rPr>
+              <a:t>Hudson/Jenkins </a:t>
+            </a:r>
+            <a:r>
+              <a:rPr lang="en-US" dirty="0" smtClean="0">
+                <a:latin typeface="Candara" pitchFamily="34" charset="0"/>
+              </a:rPr>
+              <a:t>jobs</a:t>
             </a:r>
           </a:p>
           <a:p>
@@ -12238,13 +12249,7 @@
               <a:rPr lang="fr-CA" sz="2800" smtClean="0">
                 <a:latin typeface="Candara" pitchFamily="34" charset="0"/>
               </a:rPr>
-              <a:t>in </a:t>
-            </a:r>
-            <a:r>
-              <a:rPr lang="fr-CA" sz="2800" smtClean="0">
-                <a:latin typeface="Candara" pitchFamily="34" charset="0"/>
-              </a:rPr>
-              <a:t>ms.</a:t>
+              <a:t>in ms.</a:t>
             </a:r>
             <a:endParaRPr lang="fr-CA" sz="2800" dirty="0" smtClean="0">
               <a:latin typeface="Candara" pitchFamily="34" charset="0"/>
@@ -15038,7 +15043,7 @@
                 <a:latin typeface="Candara" pitchFamily="34" charset="0"/>
                 <a:hlinkClick r:id="rId3"/>
               </a:rPr>
-              <a:t>hudson</a:t>
+              <a:t>jenkins</a:t>
             </a:r>
             <a:r>
               <a:rPr lang="fr-CA" sz="6400" dirty="0" smtClean="0">
@@ -15125,7 +15130,19 @@
               <a:rPr lang="fr-CA" sz="2800" dirty="0" smtClean="0">
                 <a:latin typeface="Candara" pitchFamily="34" charset="0"/>
               </a:rPr>
-              <a:t> Hudson jobs</a:t>
+              <a:t> </a:t>
+            </a:r>
+            <a:r>
+              <a:rPr lang="fr-CA" sz="2800" dirty="0" smtClean="0">
+                <a:latin typeface="Candara" pitchFamily="34" charset="0"/>
+              </a:rPr>
+              <a:t>Hudson/Jenkins </a:t>
+            </a:r>
+            <a:r>
+              <a:rPr lang="fr-CA" sz="2800" dirty="0" smtClean="0">
+                <a:latin typeface="Candara" pitchFamily="34" charset="0"/>
+              </a:rPr>
+              <a:t>jobs</a:t>
             </a:r>
           </a:p>
           <a:p>
@@ -15404,21 +15421,14 @@
                 <a:latin typeface="Candara" pitchFamily="34" charset="0"/>
                 <a:cs typeface="Consolas" pitchFamily="49" charset="0"/>
               </a:rPr>
-              <a:t>hudson</a:t>
+              <a:t>jenkins</a:t>
             </a:r>
             <a:r>
               <a:rPr lang="en-US" sz="2800" b="1" dirty="0" smtClean="0">
                 <a:latin typeface="Candara" pitchFamily="34" charset="0"/>
                 <a:cs typeface="Consolas" pitchFamily="49" charset="0"/>
               </a:rPr>
-              <a:t>-</a:t>
-            </a:r>
-            <a:r>
-              <a:rPr lang="en-US" sz="2800" b="1" dirty="0" err="1" smtClean="0">
-                <a:latin typeface="Candara" pitchFamily="34" charset="0"/>
-                <a:cs typeface="Consolas" pitchFamily="49" charset="0"/>
-              </a:rPr>
-              <a:t>plugin</a:t>
+              <a:t>-plugin</a:t>
             </a:r>
             <a:r>
               <a:rPr lang="en-US" sz="2800" dirty="0" smtClean="0">
@@ -15574,13 +15584,19 @@
               <a:rPr lang="en-US" sz="2800" dirty="0" err="1" smtClean="0">
                 <a:latin typeface="Candara" pitchFamily="34" charset="0"/>
               </a:rPr>
-              <a:t>hudson</a:t>
-            </a:r>
-            <a:r>
-              <a:rPr lang="en-US" sz="2800" dirty="0" smtClean="0">
-                <a:latin typeface="Candara" pitchFamily="34" charset="0"/>
-              </a:rPr>
-              <a:t>/jobs&lt;/</a:t>
+              <a:t>jenkins</a:t>
+            </a:r>
+            <a:r>
+              <a:rPr lang="en-US" sz="2800" dirty="0" smtClean="0">
+                <a:latin typeface="Candara" pitchFamily="34" charset="0"/>
+              </a:rPr>
+              <a:t>/jobs</a:t>
+            </a:r>
+            <a:r>
+              <a:rPr lang="en-US" sz="2800" dirty="0" smtClean="0">
+                <a:latin typeface="Candara" pitchFamily="34" charset="0"/>
+              </a:rPr>
+              <a:t>&lt;/</a:t>
             </a:r>
             <a:r>
               <a:rPr lang="en-US" sz="2800" dirty="0" err="1" smtClean="0">
@@ -19232,8 +19248,17 @@
               <a:rPr lang="en-US" sz="2800" dirty="0" smtClean="0">
                 <a:latin typeface="Candara" pitchFamily="34" charset="0"/>
               </a:rPr>
-              <a:t>    HUDSON_URL</a:t>
-            </a:r>
+              <a:t>    </a:t>
+            </a:r>
+            <a:r>
+              <a:rPr lang="en-US" sz="2800" dirty="0" smtClean="0">
+                <a:latin typeface="Candara" pitchFamily="34" charset="0"/>
+              </a:rPr>
+              <a:t>JENKINS_URL</a:t>
+            </a:r>
+            <a:endParaRPr lang="en-US" sz="2800" dirty="0" smtClean="0">
+              <a:latin typeface="Candara" pitchFamily="34" charset="0"/>
+            </a:endParaRPr>
           </a:p>
           <a:p>
             <a:pPr>

</xml_diff>